<commit_message>
add the svm example code and presentation
</commit_message>
<xml_diff>
--- a/20-03-2021/Presentation/Machine learning 101.pptx
+++ b/20-03-2021/Presentation/Machine learning 101.pptx
@@ -24,23 +24,24 @@
     <p:sldId id="269" r:id="rId21"/>
     <p:sldId id="270" r:id="rId22"/>
     <p:sldId id="271" r:id="rId23"/>
+    <p:sldId id="272" r:id="rId24"/>
   </p:sldIdLst>
   <p:sldSz cy="5143500" cx="9144000"/>
   <p:notesSz cx="6858000" cy="9144000"/>
   <p:embeddedFontLst>
     <p:embeddedFont>
       <p:font typeface="Raleway"/>
-      <p:regular r:id="rId24"/>
-      <p:bold r:id="rId25"/>
-      <p:italic r:id="rId26"/>
-      <p:boldItalic r:id="rId27"/>
+      <p:regular r:id="rId25"/>
+      <p:bold r:id="rId26"/>
+      <p:italic r:id="rId27"/>
+      <p:boldItalic r:id="rId28"/>
     </p:embeddedFont>
     <p:embeddedFont>
       <p:font typeface="Lato"/>
-      <p:regular r:id="rId28"/>
-      <p:bold r:id="rId29"/>
-      <p:italic r:id="rId30"/>
-      <p:boldItalic r:id="rId31"/>
+      <p:regular r:id="rId29"/>
+      <p:bold r:id="rId30"/>
+      <p:italic r:id="rId31"/>
+      <p:boldItalic r:id="rId32"/>
     </p:embeddedFont>
   </p:embeddedFontLst>
   <p:defaultTextStyle>
@@ -293,7 +294,7 @@
 
 <file path=ppt/commentAuthors.xml><?xml version="1.0" encoding="utf-8"?>
 <p:cmAuthorLst xmlns:a="http://schemas.openxmlformats.org/drawingml/2006/main" xmlns:r="http://schemas.openxmlformats.org/officeDocument/2006/relationships" xmlns:mc="http://schemas.openxmlformats.org/markup-compatibility/2006" xmlns:mv="urn:schemas-microsoft-com:mac:vml" xmlns:p="http://schemas.openxmlformats.org/presentationml/2006/main" xmlns:c="http://schemas.openxmlformats.org/drawingml/2006/chart" xmlns:dgm="http://schemas.openxmlformats.org/drawingml/2006/diagram" xmlns:o="urn:schemas-microsoft-com:office:office" xmlns:v="urn:schemas-microsoft-com:vml" xmlns:pvml="urn:schemas-microsoft-com:office:powerpoint" xmlns:com="http://schemas.openxmlformats.org/drawingml/2006/compatibility" xmlns:p14="http://schemas.microsoft.com/office/powerpoint/2010/main" xmlns:p15="http://schemas.microsoft.com/office/powerpoint/2012/main" xmlns:ahyp="http://schemas.microsoft.com/office/drawing/2018/hyperlinkcolor">
-  <p:cmAuthor clrIdx="0" id="0" initials="" lastIdx="6" name="Farouq Benarous"/>
+  <p:cmAuthor clrIdx="0" id="0" initials="" lastIdx="7" name="Farouq Benarous"/>
 </p:cmAuthorLst>
 </file>
 
@@ -349,10 +350,20 @@
 
 <file path=ppt/comments/comment6.xml><?xml version="1.0" encoding="utf-8"?>
 <p:cmLst xmlns:a="http://schemas.openxmlformats.org/drawingml/2006/main" xmlns:r="http://schemas.openxmlformats.org/officeDocument/2006/relationships" xmlns:mc="http://schemas.openxmlformats.org/markup-compatibility/2006" xmlns:mv="urn:schemas-microsoft-com:mac:vml" xmlns:p="http://schemas.openxmlformats.org/presentationml/2006/main" xmlns:c="http://schemas.openxmlformats.org/drawingml/2006/chart" xmlns:dgm="http://schemas.openxmlformats.org/drawingml/2006/diagram" xmlns:o="urn:schemas-microsoft-com:office:office" xmlns:v="urn:schemas-microsoft-com:vml" xmlns:pvml="urn:schemas-microsoft-com:office:powerpoint" xmlns:com="http://schemas.openxmlformats.org/drawingml/2006/compatibility" xmlns:p14="http://schemas.microsoft.com/office/powerpoint/2010/main" xmlns:p15="http://schemas.microsoft.com/office/powerpoint/2012/main" xmlns:ahyp="http://schemas.microsoft.com/office/drawing/2018/hyperlinkcolor">
-  <p:cm authorId="0" idx="6" dt="2021-03-08T21:11:31.510">
+  <p:cm authorId="0" idx="6" dt="2021-03-08T21:36:16.851">
     <p:pos x="6000" y="0"/>
     <p:text>* Why neuralNetwork (Motivation)
-*Explain a neuralnetwork as piece of math and not just a buzzy word</p:text>
+*Explain a neuralnetwork as piece of math and not just a buzzy word
+*Talk about the bias , variance trade-off</p:text>
+  </p:cm>
+</p:cmLst>
+</file>
+
+<file path=ppt/comments/comment7.xml><?xml version="1.0" encoding="utf-8"?>
+<p:cmLst xmlns:a="http://schemas.openxmlformats.org/drawingml/2006/main" xmlns:r="http://schemas.openxmlformats.org/officeDocument/2006/relationships" xmlns:mc="http://schemas.openxmlformats.org/markup-compatibility/2006" xmlns:mv="urn:schemas-microsoft-com:mac:vml" xmlns:p="http://schemas.openxmlformats.org/presentationml/2006/main" xmlns:c="http://schemas.openxmlformats.org/drawingml/2006/chart" xmlns:dgm="http://schemas.openxmlformats.org/drawingml/2006/diagram" xmlns:o="urn:schemas-microsoft-com:office:office" xmlns:v="urn:schemas-microsoft-com:vml" xmlns:pvml="urn:schemas-microsoft-com:office:powerpoint" xmlns:com="http://schemas.openxmlformats.org/drawingml/2006/compatibility" xmlns:p14="http://schemas.microsoft.com/office/powerpoint/2010/main" xmlns:p15="http://schemas.microsoft.com/office/powerpoint/2012/main" xmlns:ahyp="http://schemas.microsoft.com/office/drawing/2018/hyperlinkcolor">
+  <p:cm authorId="0" idx="7" dt="2021-03-09T23:47:06.235">
+    <p:pos x="6000" y="0"/>
+    <p:text>* We gonna see the linear version of it , give a hint about kernel methods</p:text>
   </p:cm>
 </p:cmLst>
 </file>
@@ -901,7 +912,7 @@
       </p:grpSpPr>
       <p:sp>
         <p:nvSpPr>
-          <p:cNvPr id="147" name="Google Shape;147;gc5276e20f2_0_58:notes"/>
+          <p:cNvPr id="147" name="Google Shape;147;gc12e0bab26_0_285:notes"/>
           <p:cNvSpPr/>
           <p:nvPr>
             <p:ph idx="2" type="sldImg"/>
@@ -936,7 +947,7 @@
       </p:sp>
       <p:sp>
         <p:nvSpPr>
-          <p:cNvPr id="148" name="Google Shape;148;gc5276e20f2_0_58:notes"/>
+          <p:cNvPr id="148" name="Google Shape;148;gc12e0bab26_0_285:notes"/>
           <p:cNvSpPr txBox="1"/>
           <p:nvPr>
             <p:ph idx="1" type="body"/>
@@ -986,7 +997,7 @@
   <p:cSld>
     <p:spTree>
       <p:nvGrpSpPr>
-        <p:cNvPr id="152" name="Shape 152"/>
+        <p:cNvPr id="153" name="Shape 153"/>
         <p:cNvGrpSpPr/>
         <p:nvPr/>
       </p:nvGrpSpPr>
@@ -1000,7 +1011,7 @@
       </p:grpSpPr>
       <p:sp>
         <p:nvSpPr>
-          <p:cNvPr id="153" name="Google Shape;153;gc12e0bab26_0_285:notes"/>
+          <p:cNvPr id="154" name="Google Shape;154;gc720029bd5_0_0:notes"/>
           <p:cNvSpPr/>
           <p:nvPr>
             <p:ph idx="2" type="sldImg"/>
@@ -1035,7 +1046,7 @@
       </p:sp>
       <p:sp>
         <p:nvSpPr>
-          <p:cNvPr id="154" name="Google Shape;154;gc12e0bab26_0_285:notes"/>
+          <p:cNvPr id="155" name="Google Shape;155;gc720029bd5_0_0:notes"/>
           <p:cNvSpPr txBox="1"/>
           <p:nvPr>
             <p:ph idx="1" type="body"/>
@@ -1099,7 +1110,7 @@
       </p:grpSpPr>
       <p:sp>
         <p:nvSpPr>
-          <p:cNvPr id="160" name="Google Shape;160;gc12e0bab26_0_233:notes"/>
+          <p:cNvPr id="160" name="Google Shape;160;gc12e0bab26_0_262:notes"/>
           <p:cNvSpPr/>
           <p:nvPr>
             <p:ph idx="2" type="sldImg"/>
@@ -1134,7 +1145,7 @@
       </p:sp>
       <p:sp>
         <p:nvSpPr>
-          <p:cNvPr id="161" name="Google Shape;161;gc12e0bab26_0_233:notes"/>
+          <p:cNvPr id="161" name="Google Shape;161;gc12e0bab26_0_262:notes"/>
           <p:cNvSpPr txBox="1"/>
           <p:nvPr>
             <p:ph idx="1" type="body"/>
@@ -1184,7 +1195,7 @@
   <p:cSld>
     <p:spTree>
       <p:nvGrpSpPr>
-        <p:cNvPr id="166" name="Shape 166"/>
+        <p:cNvPr id="165" name="Shape 165"/>
         <p:cNvGrpSpPr/>
         <p:nvPr/>
       </p:nvGrpSpPr>
@@ -1198,7 +1209,7 @@
       </p:grpSpPr>
       <p:sp>
         <p:nvSpPr>
-          <p:cNvPr id="167" name="Google Shape;167;gc12e0bab26_0_259:notes"/>
+          <p:cNvPr id="166" name="Google Shape;166;gc12e0bab26_0_259:notes"/>
           <p:cNvSpPr/>
           <p:nvPr>
             <p:ph idx="2" type="sldImg"/>
@@ -1233,7 +1244,7 @@
       </p:sp>
       <p:sp>
         <p:nvSpPr>
-          <p:cNvPr id="168" name="Google Shape;168;gc12e0bab26_0_259:notes"/>
+          <p:cNvPr id="167" name="Google Shape;167;gc12e0bab26_0_259:notes"/>
           <p:cNvSpPr txBox="1"/>
           <p:nvPr>
             <p:ph idx="1" type="body"/>
@@ -1297,7 +1308,7 @@
       </p:grpSpPr>
       <p:sp>
         <p:nvSpPr>
-          <p:cNvPr id="173" name="Google Shape;173;gc12e0bab26_0_262:notes"/>
+          <p:cNvPr id="173" name="Google Shape;173;gc12e0bab26_0_265:notes"/>
           <p:cNvSpPr/>
           <p:nvPr>
             <p:ph idx="2" type="sldImg"/>
@@ -1332,7 +1343,7 @@
       </p:sp>
       <p:sp>
         <p:nvSpPr>
-          <p:cNvPr id="174" name="Google Shape;174;gc12e0bab26_0_262:notes"/>
+          <p:cNvPr id="174" name="Google Shape;174;gc12e0bab26_0_265:notes"/>
           <p:cNvSpPr txBox="1"/>
           <p:nvPr>
             <p:ph idx="1" type="body"/>
@@ -1382,7 +1393,7 @@
   <p:cSld>
     <p:spTree>
       <p:nvGrpSpPr>
-        <p:cNvPr id="179" name="Shape 179"/>
+        <p:cNvPr id="178" name="Shape 178"/>
         <p:cNvGrpSpPr/>
         <p:nvPr/>
       </p:nvGrpSpPr>
@@ -1396,7 +1407,7 @@
       </p:grpSpPr>
       <p:sp>
         <p:nvSpPr>
-          <p:cNvPr id="180" name="Google Shape;180;gc12e0bab26_0_265:notes"/>
+          <p:cNvPr id="179" name="Google Shape;179;gc689e67e07_0_0:notes"/>
           <p:cNvSpPr/>
           <p:nvPr>
             <p:ph idx="2" type="sldImg"/>
@@ -1431,7 +1442,7 @@
       </p:sp>
       <p:sp>
         <p:nvSpPr>
-          <p:cNvPr id="181" name="Google Shape;181;gc12e0bab26_0_265:notes"/>
+          <p:cNvPr id="180" name="Google Shape;180;gc689e67e07_0_0:notes"/>
           <p:cNvSpPr txBox="1"/>
           <p:nvPr>
             <p:ph idx="1" type="body"/>
@@ -1481,7 +1492,7 @@
   <p:cSld>
     <p:spTree>
       <p:nvGrpSpPr>
-        <p:cNvPr id="185" name="Shape 185"/>
+        <p:cNvPr id="184" name="Shape 184"/>
         <p:cNvGrpSpPr/>
         <p:nvPr/>
       </p:nvGrpSpPr>
@@ -1495,7 +1506,7 @@
       </p:grpSpPr>
       <p:sp>
         <p:nvSpPr>
-          <p:cNvPr id="186" name="Google Shape;186;gc12e0bab26_0_236:notes"/>
+          <p:cNvPr id="185" name="Google Shape;185;gc12e0bab26_0_236:notes"/>
           <p:cNvSpPr/>
           <p:nvPr>
             <p:ph idx="2" type="sldImg"/>
@@ -1530,7 +1541,106 @@
       </p:sp>
       <p:sp>
         <p:nvSpPr>
-          <p:cNvPr id="187" name="Google Shape;187;gc12e0bab26_0_236:notes"/>
+          <p:cNvPr id="186" name="Google Shape;186;gc12e0bab26_0_236:notes"/>
+          <p:cNvSpPr txBox="1"/>
+          <p:nvPr>
+            <p:ph idx="1" type="body"/>
+          </p:nvPr>
+        </p:nvSpPr>
+        <p:spPr>
+          <a:xfrm>
+            <a:off x="685800" y="4343400"/>
+            <a:ext cx="5486400" cy="4114800"/>
+          </a:xfrm>
+          <a:prstGeom prst="rect">
+            <a:avLst/>
+          </a:prstGeom>
+        </p:spPr>
+        <p:txBody>
+          <a:bodyPr anchorCtr="0" anchor="t" bIns="91425" lIns="91425" spcFirstLastPara="1" rIns="91425" wrap="square" tIns="91425">
+            <a:noAutofit/>
+          </a:bodyPr>
+          <a:lstStyle/>
+          <a:p>
+            <a:pPr indent="0" lvl="0" marL="0" rtl="0" algn="l">
+              <a:spcBef>
+                <a:spcPts val="0"/>
+              </a:spcBef>
+              <a:spcAft>
+                <a:spcPts val="0"/>
+              </a:spcAft>
+              <a:buNone/>
+            </a:pPr>
+            <a:r>
+              <a:t/>
+            </a:r>
+            <a:endParaRPr/>
+          </a:p>
+        </p:txBody>
+      </p:sp>
+    </p:spTree>
+  </p:cSld>
+  <p:clrMapOvr>
+    <a:masterClrMapping/>
+  </p:clrMapOvr>
+</p:notes>
+</file>
+
+<file path=ppt/notesSlides/notesSlide17.xml><?xml version="1.0" encoding="utf-8"?>
+<p:notes xmlns:a="http://schemas.openxmlformats.org/drawingml/2006/main" xmlns:r="http://schemas.openxmlformats.org/officeDocument/2006/relationships" xmlns:mc="http://schemas.openxmlformats.org/markup-compatibility/2006" xmlns:mv="urn:schemas-microsoft-com:mac:vml" xmlns:p="http://schemas.openxmlformats.org/presentationml/2006/main" xmlns:c="http://schemas.openxmlformats.org/drawingml/2006/chart" xmlns:dgm="http://schemas.openxmlformats.org/drawingml/2006/diagram" xmlns:o="urn:schemas-microsoft-com:office:office" xmlns:v="urn:schemas-microsoft-com:vml" xmlns:pvml="urn:schemas-microsoft-com:office:powerpoint" xmlns:com="http://schemas.openxmlformats.org/drawingml/2006/compatibility" xmlns:p14="http://schemas.microsoft.com/office/powerpoint/2010/main" xmlns:p15="http://schemas.microsoft.com/office/powerpoint/2012/main" xmlns:ahyp="http://schemas.microsoft.com/office/drawing/2018/hyperlinkcolor" showMasterPhAnim="0" showMasterSp="0">
+  <p:cSld>
+    <p:spTree>
+      <p:nvGrpSpPr>
+        <p:cNvPr id="189" name="Shape 189"/>
+        <p:cNvGrpSpPr/>
+        <p:nvPr/>
+      </p:nvGrpSpPr>
+      <p:grpSpPr>
+        <a:xfrm>
+          <a:off x="0" y="0"/>
+          <a:ext cx="0" cy="0"/>
+          <a:chOff x="0" y="0"/>
+          <a:chExt cx="0" cy="0"/>
+        </a:xfrm>
+      </p:grpSpPr>
+      <p:sp>
+        <p:nvSpPr>
+          <p:cNvPr id="190" name="Google Shape;190;gc689e67e07_0_6:notes"/>
+          <p:cNvSpPr/>
+          <p:nvPr>
+            <p:ph idx="2" type="sldImg"/>
+          </p:nvPr>
+        </p:nvSpPr>
+        <p:spPr>
+          <a:xfrm>
+            <a:off x="381300" y="685800"/>
+            <a:ext cx="6096000" cy="3429000"/>
+          </a:xfrm>
+          <a:custGeom>
+            <a:rect b="b" l="l" r="r" t="t"/>
+            <a:pathLst>
+              <a:path extrusionOk="0" h="120000" w="120000">
+                <a:moveTo>
+                  <a:pt x="0" y="0"/>
+                </a:moveTo>
+                <a:lnTo>
+                  <a:pt x="120000" y="0"/>
+                </a:lnTo>
+                <a:lnTo>
+                  <a:pt x="120000" y="120000"/>
+                </a:lnTo>
+                <a:lnTo>
+                  <a:pt x="0" y="120000"/>
+                </a:lnTo>
+                <a:close/>
+              </a:path>
+            </a:pathLst>
+          </a:custGeom>
+        </p:spPr>
+      </p:sp>
+      <p:sp>
+        <p:nvSpPr>
+          <p:cNvPr id="191" name="Google Shape;191;gc689e67e07_0_6:notes"/>
           <p:cNvSpPr txBox="1"/>
           <p:nvPr>
             <p:ph idx="1" type="body"/>
@@ -8761,7 +8871,7 @@
           </a:bodyPr>
           <a:lstStyle/>
           <a:p>
-            <a:pPr indent="0" lvl="0" marL="0" rtl="0" algn="ctr">
+            <a:pPr indent="0" lvl="0" marL="0" rtl="0" algn="l">
               <a:spcBef>
                 <a:spcPts val="0"/>
               </a:spcBef>
@@ -8777,7 +8887,25 @@
                 <a:cs typeface="Lato"/>
                 <a:sym typeface="Lato"/>
               </a:rPr>
-              <a:t>Pseudo of code </a:t>
+              <a:t>The computer program </a:t>
+            </a:r>
+            <a:r>
+              <a:rPr b="1" lang="en-GB">
+                <a:latin typeface="Lato"/>
+                <a:ea typeface="Lato"/>
+                <a:cs typeface="Lato"/>
+                <a:sym typeface="Lato"/>
+              </a:rPr>
+              <a:t>A</a:t>
+            </a:r>
+            <a:r>
+              <a:rPr lang="en-GB">
+                <a:latin typeface="Lato"/>
+                <a:ea typeface="Lato"/>
+                <a:cs typeface="Lato"/>
+                <a:sym typeface="Lato"/>
+              </a:rPr>
+              <a:t> (the model) </a:t>
             </a:r>
             <a:endParaRPr>
               <a:latin typeface="Lato"/>
@@ -8791,148 +8919,6 @@
       <p:sp>
         <p:nvSpPr>
           <p:cNvPr id="151" name="Google Shape;151;p22"/>
-          <p:cNvSpPr txBox="1"/>
-          <p:nvPr/>
-        </p:nvSpPr>
-        <p:spPr>
-          <a:xfrm>
-            <a:off x="682475" y="615875"/>
-            <a:ext cx="4153200" cy="431100"/>
-          </a:xfrm>
-          <a:prstGeom prst="rect">
-            <a:avLst/>
-          </a:prstGeom>
-          <a:noFill/>
-          <a:ln>
-            <a:noFill/>
-          </a:ln>
-        </p:spPr>
-        <p:txBody>
-          <a:bodyPr anchorCtr="0" anchor="t" bIns="91425" lIns="91425" spcFirstLastPara="1" rIns="91425" wrap="square" tIns="91425">
-            <a:spAutoFit/>
-          </a:bodyPr>
-          <a:lstStyle/>
-          <a:p>
-            <a:pPr indent="0" lvl="0" marL="0" rtl="0" algn="l">
-              <a:spcBef>
-                <a:spcPts val="0"/>
-              </a:spcBef>
-              <a:spcAft>
-                <a:spcPts val="0"/>
-              </a:spcAft>
-              <a:buNone/>
-            </a:pPr>
-            <a:r>
-              <a:rPr b="1" lang="en-GB" sz="1600">
-                <a:latin typeface="Lato"/>
-                <a:ea typeface="Lato"/>
-                <a:cs typeface="Lato"/>
-                <a:sym typeface="Lato"/>
-              </a:rPr>
-              <a:t>What is machine learning  ? </a:t>
-            </a:r>
-            <a:endParaRPr b="1" sz="1500"/>
-          </a:p>
-        </p:txBody>
-      </p:sp>
-    </p:spTree>
-  </p:cSld>
-  <p:clrMapOvr>
-    <a:masterClrMapping/>
-  </p:clrMapOvr>
-</p:sld>
-</file>
-
-<file path=ppt/slides/slide11.xml><?xml version="1.0" encoding="utf-8"?>
-<p:sld xmlns:a="http://schemas.openxmlformats.org/drawingml/2006/main" xmlns:r="http://schemas.openxmlformats.org/officeDocument/2006/relationships" xmlns:mc="http://schemas.openxmlformats.org/markup-compatibility/2006" xmlns:mv="urn:schemas-microsoft-com:mac:vml" xmlns:p="http://schemas.openxmlformats.org/presentationml/2006/main" xmlns:c="http://schemas.openxmlformats.org/drawingml/2006/chart" xmlns:dgm="http://schemas.openxmlformats.org/drawingml/2006/diagram" xmlns:o="urn:schemas-microsoft-com:office:office" xmlns:v="urn:schemas-microsoft-com:vml" xmlns:pvml="urn:schemas-microsoft-com:office:powerpoint" xmlns:com="http://schemas.openxmlformats.org/drawingml/2006/compatibility" xmlns:p14="http://schemas.microsoft.com/office/powerpoint/2010/main" xmlns:p15="http://schemas.microsoft.com/office/powerpoint/2012/main" xmlns:ahyp="http://schemas.microsoft.com/office/drawing/2018/hyperlinkcolor">
-  <p:cSld>
-    <p:spTree>
-      <p:nvGrpSpPr>
-        <p:cNvPr id="155" name="Shape 155"/>
-        <p:cNvGrpSpPr/>
-        <p:nvPr/>
-      </p:nvGrpSpPr>
-      <p:grpSpPr>
-        <a:xfrm>
-          <a:off x="0" y="0"/>
-          <a:ext cx="0" cy="0"/>
-          <a:chOff x="0" y="0"/>
-          <a:chExt cx="0" cy="0"/>
-        </a:xfrm>
-      </p:grpSpPr>
-      <p:sp>
-        <p:nvSpPr>
-          <p:cNvPr id="156" name="Google Shape;156;p23"/>
-          <p:cNvSpPr txBox="1"/>
-          <p:nvPr/>
-        </p:nvSpPr>
-        <p:spPr>
-          <a:xfrm>
-            <a:off x="2668175" y="1221000"/>
-            <a:ext cx="3487200" cy="400200"/>
-          </a:xfrm>
-          <a:prstGeom prst="rect">
-            <a:avLst/>
-          </a:prstGeom>
-          <a:noFill/>
-          <a:ln>
-            <a:noFill/>
-          </a:ln>
-        </p:spPr>
-        <p:txBody>
-          <a:bodyPr anchorCtr="0" anchor="t" bIns="91425" lIns="91425" spcFirstLastPara="1" rIns="91425" wrap="square" tIns="91425">
-            <a:spAutoFit/>
-          </a:bodyPr>
-          <a:lstStyle/>
-          <a:p>
-            <a:pPr indent="0" lvl="0" marL="0" rtl="0" algn="l">
-              <a:spcBef>
-                <a:spcPts val="0"/>
-              </a:spcBef>
-              <a:spcAft>
-                <a:spcPts val="0"/>
-              </a:spcAft>
-              <a:buNone/>
-            </a:pPr>
-            <a:r>
-              <a:rPr lang="en-GB">
-                <a:latin typeface="Lato"/>
-                <a:ea typeface="Lato"/>
-                <a:cs typeface="Lato"/>
-                <a:sym typeface="Lato"/>
-              </a:rPr>
-              <a:t>The computer program </a:t>
-            </a:r>
-            <a:r>
-              <a:rPr b="1" lang="en-GB">
-                <a:latin typeface="Lato"/>
-                <a:ea typeface="Lato"/>
-                <a:cs typeface="Lato"/>
-                <a:sym typeface="Lato"/>
-              </a:rPr>
-              <a:t>A</a:t>
-            </a:r>
-            <a:r>
-              <a:rPr lang="en-GB">
-                <a:latin typeface="Lato"/>
-                <a:ea typeface="Lato"/>
-                <a:cs typeface="Lato"/>
-                <a:sym typeface="Lato"/>
-              </a:rPr>
-              <a:t> (the model) </a:t>
-            </a:r>
-            <a:endParaRPr>
-              <a:latin typeface="Lato"/>
-              <a:ea typeface="Lato"/>
-              <a:cs typeface="Lato"/>
-              <a:sym typeface="Lato"/>
-            </a:endParaRPr>
-          </a:p>
-        </p:txBody>
-      </p:sp>
-      <p:sp>
-        <p:nvSpPr>
-          <p:cNvPr id="157" name="Google Shape;157;p23"/>
           <p:cNvSpPr txBox="1"/>
           <p:nvPr/>
         </p:nvSpPr>
@@ -8979,7 +8965,7 @@
       </p:sp>
       <p:pic>
         <p:nvPicPr>
-          <p:cNvPr id="158" name="Google Shape;158;p23"/>
+          <p:cNvPr id="152" name="Google Shape;152;p22"/>
           <p:cNvPicPr preferRelativeResize="0"/>
           <p:nvPr/>
         </p:nvPicPr>
@@ -8993,8 +8979,8 @@
         </p:blipFill>
         <p:spPr>
           <a:xfrm>
-            <a:off x="1812650" y="1658925"/>
-            <a:ext cx="5089191" cy="3043474"/>
+            <a:off x="1769125" y="1666950"/>
+            <a:ext cx="5156800" cy="3083899"/>
           </a:xfrm>
           <a:prstGeom prst="rect">
             <a:avLst/>
@@ -9005,6 +8991,106 @@
           </a:ln>
         </p:spPr>
       </p:pic>
+    </p:spTree>
+  </p:cSld>
+  <p:clrMapOvr>
+    <a:masterClrMapping/>
+  </p:clrMapOvr>
+</p:sld>
+</file>
+
+<file path=ppt/slides/slide11.xml><?xml version="1.0" encoding="utf-8"?>
+<p:sld xmlns:a="http://schemas.openxmlformats.org/drawingml/2006/main" xmlns:r="http://schemas.openxmlformats.org/officeDocument/2006/relationships" xmlns:mc="http://schemas.openxmlformats.org/markup-compatibility/2006" xmlns:mv="urn:schemas-microsoft-com:mac:vml" xmlns:p="http://schemas.openxmlformats.org/presentationml/2006/main" xmlns:c="http://schemas.openxmlformats.org/drawingml/2006/chart" xmlns:dgm="http://schemas.openxmlformats.org/drawingml/2006/diagram" xmlns:o="urn:schemas-microsoft-com:office:office" xmlns:v="urn:schemas-microsoft-com:vml" xmlns:pvml="urn:schemas-microsoft-com:office:powerpoint" xmlns:com="http://schemas.openxmlformats.org/drawingml/2006/compatibility" xmlns:p14="http://schemas.microsoft.com/office/powerpoint/2010/main" xmlns:p15="http://schemas.microsoft.com/office/powerpoint/2012/main" xmlns:ahyp="http://schemas.microsoft.com/office/drawing/2018/hyperlinkcolor">
+  <p:cSld>
+    <p:spTree>
+      <p:nvGrpSpPr>
+        <p:cNvPr id="156" name="Shape 156"/>
+        <p:cNvGrpSpPr/>
+        <p:nvPr/>
+      </p:nvGrpSpPr>
+      <p:grpSpPr>
+        <a:xfrm>
+          <a:off x="0" y="0"/>
+          <a:ext cx="0" cy="0"/>
+          <a:chOff x="0" y="0"/>
+          <a:chExt cx="0" cy="0"/>
+        </a:xfrm>
+      </p:grpSpPr>
+      <p:pic>
+        <p:nvPicPr>
+          <p:cNvPr id="157" name="Google Shape;157;p23"/>
+          <p:cNvPicPr preferRelativeResize="0"/>
+          <p:nvPr/>
+        </p:nvPicPr>
+        <p:blipFill>
+          <a:blip r:embed="rId3">
+            <a:alphaModFix/>
+          </a:blip>
+          <a:stretch>
+            <a:fillRect/>
+          </a:stretch>
+        </p:blipFill>
+        <p:spPr>
+          <a:xfrm>
+            <a:off x="85800" y="1367525"/>
+            <a:ext cx="8973651" cy="3471575"/>
+          </a:xfrm>
+          <a:prstGeom prst="rect">
+            <a:avLst/>
+          </a:prstGeom>
+          <a:noFill/>
+          <a:ln>
+            <a:noFill/>
+          </a:ln>
+        </p:spPr>
+      </p:pic>
+      <p:sp>
+        <p:nvSpPr>
+          <p:cNvPr id="158" name="Google Shape;158;p23"/>
+          <p:cNvSpPr txBox="1"/>
+          <p:nvPr/>
+        </p:nvSpPr>
+        <p:spPr>
+          <a:xfrm>
+            <a:off x="699200" y="615875"/>
+            <a:ext cx="5776200" cy="431100"/>
+          </a:xfrm>
+          <a:prstGeom prst="rect">
+            <a:avLst/>
+          </a:prstGeom>
+          <a:noFill/>
+          <a:ln>
+            <a:noFill/>
+          </a:ln>
+        </p:spPr>
+        <p:txBody>
+          <a:bodyPr anchorCtr="0" anchor="t" bIns="91425" lIns="91425" spcFirstLastPara="1" rIns="91425" wrap="square" tIns="91425">
+            <a:spAutoFit/>
+          </a:bodyPr>
+          <a:lstStyle/>
+          <a:p>
+            <a:pPr indent="0" lvl="0" marL="0" rtl="0" algn="l">
+              <a:spcBef>
+                <a:spcPts val="0"/>
+              </a:spcBef>
+              <a:spcAft>
+                <a:spcPts val="0"/>
+              </a:spcAft>
+              <a:buNone/>
+            </a:pPr>
+            <a:r>
+              <a:rPr b="1" lang="en-GB" sz="1600">
+                <a:latin typeface="Lato"/>
+                <a:ea typeface="Lato"/>
+                <a:cs typeface="Lato"/>
+                <a:sym typeface="Lato"/>
+              </a:rPr>
+              <a:t>What types of models are there   ? </a:t>
+            </a:r>
+            <a:endParaRPr b="1" sz="1500"/>
+          </a:p>
+        </p:txBody>
+      </p:sp>
     </p:spTree>
   </p:cSld>
   <p:clrMapOvr>
@@ -9030,24 +9116,16 @@
           <a:chExt cx="0" cy="0"/>
         </a:xfrm>
       </p:grpSpPr>
-      <p:pic>
-        <p:nvPicPr>
+      <p:sp>
+        <p:nvSpPr>
           <p:cNvPr id="163" name="Google Shape;163;p24"/>
-          <p:cNvPicPr preferRelativeResize="0"/>
+          <p:cNvSpPr txBox="1"/>
           <p:nvPr/>
-        </p:nvPicPr>
-        <p:blipFill>
-          <a:blip r:embed="rId3">
-            <a:alphaModFix/>
-          </a:blip>
-          <a:stretch>
-            <a:fillRect/>
-          </a:stretch>
-        </p:blipFill>
+        </p:nvSpPr>
         <p:spPr>
           <a:xfrm>
-            <a:off x="85800" y="1367525"/>
-            <a:ext cx="4724876" cy="3085725"/>
+            <a:off x="2427300" y="1085075"/>
+            <a:ext cx="5536500" cy="400200"/>
           </a:xfrm>
           <a:prstGeom prst="rect">
             <a:avLst/>
@@ -9057,44 +9135,48 @@
             <a:noFill/>
           </a:ln>
         </p:spPr>
-      </p:pic>
-      <p:pic>
-        <p:nvPicPr>
-          <p:cNvPr id="164" name="Google Shape;164;p24"/>
-          <p:cNvPicPr preferRelativeResize="0"/>
-          <p:nvPr/>
-        </p:nvPicPr>
-        <p:blipFill>
-          <a:blip r:embed="rId4">
-            <a:alphaModFix/>
-          </a:blip>
-          <a:stretch>
-            <a:fillRect/>
-          </a:stretch>
-        </p:blipFill>
-        <p:spPr>
-          <a:xfrm>
-            <a:off x="4810675" y="1367525"/>
-            <a:ext cx="4203000" cy="3085725"/>
-          </a:xfrm>
-          <a:prstGeom prst="rect">
-            <a:avLst/>
-          </a:prstGeom>
-          <a:noFill/>
-          <a:ln>
-            <a:noFill/>
-          </a:ln>
-        </p:spPr>
-      </p:pic>
+        <p:txBody>
+          <a:bodyPr anchorCtr="0" anchor="t" bIns="91425" lIns="91425" spcFirstLastPara="1" rIns="91425" wrap="square" tIns="91425">
+            <a:spAutoFit/>
+          </a:bodyPr>
+          <a:lstStyle/>
+          <a:p>
+            <a:pPr indent="0" lvl="0" marL="0" rtl="0" algn="l">
+              <a:spcBef>
+                <a:spcPts val="0"/>
+              </a:spcBef>
+              <a:spcAft>
+                <a:spcPts val="0"/>
+              </a:spcAft>
+              <a:buNone/>
+            </a:pPr>
+            <a:r>
+              <a:rPr b="1" lang="en-GB">
+                <a:latin typeface="Lato"/>
+                <a:ea typeface="Lato"/>
+                <a:cs typeface="Lato"/>
+                <a:sym typeface="Lato"/>
+              </a:rPr>
+              <a:t>Connectionist Master Algorithm : Neural Network (Vanila) </a:t>
+            </a:r>
+            <a:endParaRPr b="1">
+              <a:latin typeface="Lato"/>
+              <a:ea typeface="Lato"/>
+              <a:cs typeface="Lato"/>
+              <a:sym typeface="Lato"/>
+            </a:endParaRPr>
+          </a:p>
+        </p:txBody>
+      </p:sp>
       <p:sp>
         <p:nvSpPr>
-          <p:cNvPr id="165" name="Google Shape;165;p24"/>
+          <p:cNvPr id="164" name="Google Shape;164;p24"/>
           <p:cNvSpPr txBox="1"/>
           <p:nvPr/>
         </p:nvSpPr>
         <p:spPr>
           <a:xfrm>
-            <a:off x="699200" y="615875"/>
+            <a:off x="665925" y="590900"/>
             <a:ext cx="5776200" cy="431100"/>
           </a:xfrm>
           <a:prstGeom prst="rect">
@@ -9127,7 +9209,16 @@
                 <a:cs typeface="Lato"/>
                 <a:sym typeface="Lato"/>
               </a:rPr>
-              <a:t>What types of models are there   ? </a:t>
+              <a:t>Models examples</a:t>
+            </a:r>
+            <a:r>
+              <a:rPr b="1" lang="en-GB" sz="1600">
+                <a:latin typeface="Lato"/>
+                <a:ea typeface="Lato"/>
+                <a:cs typeface="Lato"/>
+                <a:sym typeface="Lato"/>
+              </a:rPr>
+              <a:t> ? </a:t>
             </a:r>
             <a:endParaRPr b="1" sz="1500"/>
           </a:p>
@@ -9146,7 +9237,7 @@
   <p:cSld>
     <p:spTree>
       <p:nvGrpSpPr>
-        <p:cNvPr id="169" name="Shape 169"/>
+        <p:cNvPr id="168" name="Shape 168"/>
         <p:cNvGrpSpPr/>
         <p:nvPr/>
       </p:nvGrpSpPr>
@@ -9160,13 +9251,13 @@
       </p:grpSpPr>
       <p:sp>
         <p:nvSpPr>
-          <p:cNvPr id="170" name="Google Shape;170;p25"/>
+          <p:cNvPr id="169" name="Google Shape;169;p25"/>
           <p:cNvSpPr txBox="1"/>
           <p:nvPr/>
         </p:nvSpPr>
         <p:spPr>
           <a:xfrm>
-            <a:off x="2283225" y="1007600"/>
+            <a:off x="2260450" y="871050"/>
             <a:ext cx="4727400" cy="400200"/>
           </a:xfrm>
           <a:prstGeom prst="rect">
@@ -9193,7 +9284,7 @@
               <a:buNone/>
             </a:pPr>
             <a:r>
-              <a:rPr lang="en-GB">
+              <a:rPr b="1" lang="en-GB">
                 <a:latin typeface="Lato"/>
                 <a:ea typeface="Lato"/>
                 <a:cs typeface="Lato"/>
@@ -9202,7 +9293,7 @@
               <a:t>Analogizers Master Algorithm : </a:t>
             </a:r>
             <a:r>
-              <a:rPr lang="en-GB">
+              <a:rPr b="1" lang="en-GB">
                 <a:latin typeface="Lato"/>
                 <a:ea typeface="Lato"/>
                 <a:cs typeface="Lato"/>
@@ -9211,7 +9302,7 @@
               <a:t>Support</a:t>
             </a:r>
             <a:r>
-              <a:rPr lang="en-GB">
+              <a:rPr b="1" lang="en-GB">
                 <a:latin typeface="Lato"/>
                 <a:ea typeface="Lato"/>
                 <a:cs typeface="Lato"/>
@@ -9219,7 +9310,7 @@
               </a:rPr>
               <a:t> Vector machine  </a:t>
             </a:r>
-            <a:endParaRPr>
+            <a:endParaRPr b="1">
               <a:latin typeface="Lato"/>
               <a:ea typeface="Lato"/>
               <a:cs typeface="Lato"/>
@@ -9230,13 +9321,13 @@
       </p:sp>
       <p:sp>
         <p:nvSpPr>
-          <p:cNvPr id="171" name="Google Shape;171;p25"/>
+          <p:cNvPr id="170" name="Google Shape;170;p25"/>
           <p:cNvSpPr txBox="1"/>
           <p:nvPr/>
         </p:nvSpPr>
         <p:spPr>
           <a:xfrm>
-            <a:off x="699200" y="615875"/>
+            <a:off x="377300" y="561350"/>
             <a:ext cx="5776200" cy="431100"/>
           </a:xfrm>
           <a:prstGeom prst="rect">
@@ -9272,6 +9363,460 @@
               <a:t>Models examples ? </a:t>
             </a:r>
             <a:endParaRPr b="1" sz="1500"/>
+          </a:p>
+        </p:txBody>
+      </p:sp>
+      <p:sp>
+        <p:nvSpPr>
+          <p:cNvPr id="171" name="Google Shape;171;p25"/>
+          <p:cNvSpPr txBox="1"/>
+          <p:nvPr/>
+        </p:nvSpPr>
+        <p:spPr>
+          <a:xfrm>
+            <a:off x="377300" y="1362475"/>
+            <a:ext cx="8208600" cy="2770500"/>
+          </a:xfrm>
+          <a:prstGeom prst="rect">
+            <a:avLst/>
+          </a:prstGeom>
+          <a:noFill/>
+          <a:ln>
+            <a:noFill/>
+          </a:ln>
+        </p:spPr>
+        <p:txBody>
+          <a:bodyPr anchorCtr="0" anchor="t" bIns="91425" lIns="91425" spcFirstLastPara="1" rIns="91425" wrap="square" tIns="91425">
+            <a:spAutoFit/>
+          </a:bodyPr>
+          <a:lstStyle/>
+          <a:p>
+            <a:pPr indent="-317500" lvl="0" marL="457200" rtl="0" algn="l">
+              <a:lnSpc>
+                <a:spcPct val="100000"/>
+              </a:lnSpc>
+              <a:spcBef>
+                <a:spcPts val="0"/>
+              </a:spcBef>
+              <a:spcAft>
+                <a:spcPts val="0"/>
+              </a:spcAft>
+              <a:buSzPts val="1400"/>
+              <a:buFont typeface="Lato"/>
+              <a:buChar char="●"/>
+            </a:pPr>
+            <a:r>
+              <a:rPr lang="en-GB">
+                <a:latin typeface="Lato"/>
+                <a:ea typeface="Lato"/>
+                <a:cs typeface="Lato"/>
+                <a:sym typeface="Lato"/>
+              </a:rPr>
+              <a:t>What is a Support vector </a:t>
+            </a:r>
+            <a:r>
+              <a:rPr lang="en-GB">
+                <a:latin typeface="Lato"/>
+                <a:ea typeface="Lato"/>
+                <a:cs typeface="Lato"/>
+                <a:sym typeface="Lato"/>
+              </a:rPr>
+              <a:t>machine</a:t>
+            </a:r>
+            <a:r>
+              <a:rPr lang="en-GB">
+                <a:latin typeface="Lato"/>
+                <a:ea typeface="Lato"/>
+                <a:cs typeface="Lato"/>
+                <a:sym typeface="Lato"/>
+              </a:rPr>
+              <a:t> ?</a:t>
+            </a:r>
+            <a:endParaRPr>
+              <a:latin typeface="Lato"/>
+              <a:ea typeface="Lato"/>
+              <a:cs typeface="Lato"/>
+              <a:sym typeface="Lato"/>
+            </a:endParaRPr>
+          </a:p>
+          <a:p>
+            <a:pPr indent="-317500" lvl="1" marL="914400" rtl="0" algn="l">
+              <a:lnSpc>
+                <a:spcPct val="100000"/>
+              </a:lnSpc>
+              <a:spcBef>
+                <a:spcPts val="0"/>
+              </a:spcBef>
+              <a:spcAft>
+                <a:spcPts val="0"/>
+              </a:spcAft>
+              <a:buSzPts val="1400"/>
+              <a:buFont typeface="Lato"/>
+              <a:buChar char="○"/>
+            </a:pPr>
+            <a:r>
+              <a:rPr lang="en-GB">
+                <a:latin typeface="Lato"/>
+                <a:ea typeface="Lato"/>
+                <a:cs typeface="Lato"/>
+                <a:sym typeface="Lato"/>
+              </a:rPr>
+              <a:t>Developed by Rosenblatt at AT&amp;T in 1958</a:t>
+            </a:r>
+            <a:endParaRPr>
+              <a:latin typeface="Lato"/>
+              <a:ea typeface="Lato"/>
+              <a:cs typeface="Lato"/>
+              <a:sym typeface="Lato"/>
+            </a:endParaRPr>
+          </a:p>
+          <a:p>
+            <a:pPr indent="-317500" lvl="1" marL="914400" rtl="0" algn="l">
+              <a:lnSpc>
+                <a:spcPct val="100000"/>
+              </a:lnSpc>
+              <a:spcBef>
+                <a:spcPts val="0"/>
+              </a:spcBef>
+              <a:spcAft>
+                <a:spcPts val="0"/>
+              </a:spcAft>
+              <a:buSzPts val="1400"/>
+              <a:buFont typeface="Lato"/>
+              <a:buChar char="○"/>
+            </a:pPr>
+            <a:r>
+              <a:rPr lang="en-GB">
+                <a:latin typeface="Lato"/>
+                <a:ea typeface="Lato"/>
+                <a:cs typeface="Lato"/>
+                <a:sym typeface="Lato"/>
+              </a:rPr>
+              <a:t>It uses a support vectors to calibrate </a:t>
+            </a:r>
+            <a:r>
+              <a:rPr lang="en-GB">
+                <a:latin typeface="Lato"/>
+                <a:ea typeface="Lato"/>
+                <a:cs typeface="Lato"/>
+                <a:sym typeface="Lato"/>
+              </a:rPr>
+              <a:t>the dividing hyperplane</a:t>
+            </a:r>
+            <a:endParaRPr>
+              <a:latin typeface="Lato"/>
+              <a:ea typeface="Lato"/>
+              <a:cs typeface="Lato"/>
+              <a:sym typeface="Lato"/>
+            </a:endParaRPr>
+          </a:p>
+          <a:p>
+            <a:pPr indent="0" lvl="0" marL="0" rtl="0" algn="l">
+              <a:lnSpc>
+                <a:spcPct val="100000"/>
+              </a:lnSpc>
+              <a:spcBef>
+                <a:spcPts val="0"/>
+              </a:spcBef>
+              <a:spcAft>
+                <a:spcPts val="0"/>
+              </a:spcAft>
+              <a:buNone/>
+            </a:pPr>
+            <a:r>
+              <a:t/>
+            </a:r>
+            <a:endParaRPr>
+              <a:latin typeface="Lato"/>
+              <a:ea typeface="Lato"/>
+              <a:cs typeface="Lato"/>
+              <a:sym typeface="Lato"/>
+            </a:endParaRPr>
+          </a:p>
+          <a:p>
+            <a:pPr indent="-317500" lvl="0" marL="457200" rtl="0" algn="l">
+              <a:lnSpc>
+                <a:spcPct val="100000"/>
+              </a:lnSpc>
+              <a:spcBef>
+                <a:spcPts val="0"/>
+              </a:spcBef>
+              <a:spcAft>
+                <a:spcPts val="0"/>
+              </a:spcAft>
+              <a:buSzPts val="1400"/>
+              <a:buFont typeface="Lato"/>
+              <a:buChar char="●"/>
+            </a:pPr>
+            <a:r>
+              <a:rPr lang="en-GB">
+                <a:latin typeface="Lato"/>
+                <a:ea typeface="Lato"/>
+                <a:cs typeface="Lato"/>
+                <a:sym typeface="Lato"/>
+              </a:rPr>
+              <a:t>Intuition</a:t>
+            </a:r>
+            <a:r>
+              <a:rPr lang="en-GB">
+                <a:latin typeface="Lato"/>
+                <a:ea typeface="Lato"/>
+                <a:cs typeface="Lato"/>
+                <a:sym typeface="Lato"/>
+              </a:rPr>
+              <a:t> that it hinges on ? and h</a:t>
+            </a:r>
+            <a:r>
+              <a:rPr lang="en-GB">
+                <a:latin typeface="Lato"/>
+                <a:ea typeface="Lato"/>
+                <a:cs typeface="Lato"/>
+                <a:sym typeface="Lato"/>
+              </a:rPr>
+              <a:t>ow it differs from </a:t>
+            </a:r>
+            <a:r>
+              <a:rPr lang="en-GB">
+                <a:latin typeface="Lato"/>
+                <a:ea typeface="Lato"/>
+                <a:cs typeface="Lato"/>
+                <a:sym typeface="Lato"/>
+              </a:rPr>
+              <a:t>  other models ?</a:t>
+            </a:r>
+            <a:endParaRPr>
+              <a:latin typeface="Lato"/>
+              <a:ea typeface="Lato"/>
+              <a:cs typeface="Lato"/>
+              <a:sym typeface="Lato"/>
+            </a:endParaRPr>
+          </a:p>
+          <a:p>
+            <a:pPr indent="-317500" lvl="1" marL="914400" rtl="0" algn="l">
+              <a:lnSpc>
+                <a:spcPct val="100000"/>
+              </a:lnSpc>
+              <a:spcBef>
+                <a:spcPts val="0"/>
+              </a:spcBef>
+              <a:spcAft>
+                <a:spcPts val="0"/>
+              </a:spcAft>
+              <a:buSzPts val="1400"/>
+              <a:buFont typeface="Lato"/>
+              <a:buChar char="○"/>
+            </a:pPr>
+            <a:r>
+              <a:rPr lang="en-GB">
+                <a:latin typeface="Lato"/>
+                <a:ea typeface="Lato"/>
+                <a:cs typeface="Lato"/>
+                <a:sym typeface="Lato"/>
+              </a:rPr>
+              <a:t>Non-probabilistic Geometric loss function </a:t>
+            </a:r>
+            <a:endParaRPr>
+              <a:latin typeface="Lato"/>
+              <a:ea typeface="Lato"/>
+              <a:cs typeface="Lato"/>
+              <a:sym typeface="Lato"/>
+            </a:endParaRPr>
+          </a:p>
+          <a:p>
+            <a:pPr indent="-317500" lvl="1" marL="914400" rtl="0" algn="l">
+              <a:lnSpc>
+                <a:spcPct val="100000"/>
+              </a:lnSpc>
+              <a:spcBef>
+                <a:spcPts val="0"/>
+              </a:spcBef>
+              <a:spcAft>
+                <a:spcPts val="0"/>
+              </a:spcAft>
+              <a:buSzPts val="1400"/>
+              <a:buFont typeface="Lato"/>
+              <a:buChar char="○"/>
+            </a:pPr>
+            <a:r>
+              <a:rPr lang="en-GB">
+                <a:latin typeface="Lato"/>
+                <a:ea typeface="Lato"/>
+                <a:cs typeface="Lato"/>
+                <a:sym typeface="Lato"/>
+              </a:rPr>
+              <a:t>Maximizing margins(support vectors) between the classes </a:t>
+            </a:r>
+            <a:endParaRPr>
+              <a:latin typeface="Lato"/>
+              <a:ea typeface="Lato"/>
+              <a:cs typeface="Lato"/>
+              <a:sym typeface="Lato"/>
+            </a:endParaRPr>
+          </a:p>
+          <a:p>
+            <a:pPr indent="0" lvl="0" marL="0" rtl="0" algn="l">
+              <a:lnSpc>
+                <a:spcPct val="100000"/>
+              </a:lnSpc>
+              <a:spcBef>
+                <a:spcPts val="0"/>
+              </a:spcBef>
+              <a:spcAft>
+                <a:spcPts val="0"/>
+              </a:spcAft>
+              <a:buNone/>
+            </a:pPr>
+            <a:r>
+              <a:t/>
+            </a:r>
+            <a:endParaRPr>
+              <a:latin typeface="Lato"/>
+              <a:ea typeface="Lato"/>
+              <a:cs typeface="Lato"/>
+              <a:sym typeface="Lato"/>
+            </a:endParaRPr>
+          </a:p>
+          <a:p>
+            <a:pPr indent="-317500" lvl="0" marL="457200" rtl="0" algn="l">
+              <a:lnSpc>
+                <a:spcPct val="100000"/>
+              </a:lnSpc>
+              <a:spcBef>
+                <a:spcPts val="0"/>
+              </a:spcBef>
+              <a:spcAft>
+                <a:spcPts val="0"/>
+              </a:spcAft>
+              <a:buSzPts val="1400"/>
+              <a:buFont typeface="Lato"/>
+              <a:buChar char="●"/>
+            </a:pPr>
+            <a:r>
+              <a:rPr lang="en-GB">
+                <a:latin typeface="Lato"/>
+                <a:ea typeface="Lato"/>
+                <a:cs typeface="Lato"/>
+                <a:sym typeface="Lato"/>
+              </a:rPr>
+              <a:t> What’s the use cases of it  ?</a:t>
+            </a:r>
+            <a:endParaRPr>
+              <a:latin typeface="Lato"/>
+              <a:ea typeface="Lato"/>
+              <a:cs typeface="Lato"/>
+              <a:sym typeface="Lato"/>
+            </a:endParaRPr>
+          </a:p>
+          <a:p>
+            <a:pPr indent="-317500" lvl="1" marL="914400" rtl="0" algn="l">
+              <a:lnSpc>
+                <a:spcPct val="100000"/>
+              </a:lnSpc>
+              <a:spcBef>
+                <a:spcPts val="0"/>
+              </a:spcBef>
+              <a:spcAft>
+                <a:spcPts val="0"/>
+              </a:spcAft>
+              <a:buSzPts val="1400"/>
+              <a:buFont typeface="Lato"/>
+              <a:buChar char="○"/>
+            </a:pPr>
+            <a:r>
+              <a:rPr lang="en-GB">
+                <a:latin typeface="Lato"/>
+                <a:ea typeface="Lato"/>
+                <a:cs typeface="Lato"/>
+                <a:sym typeface="Lato"/>
+              </a:rPr>
+              <a:t>Regression and classification and even unsupervised learning</a:t>
+            </a:r>
+            <a:endParaRPr>
+              <a:latin typeface="Lato"/>
+              <a:ea typeface="Lato"/>
+              <a:cs typeface="Lato"/>
+              <a:sym typeface="Lato"/>
+            </a:endParaRPr>
+          </a:p>
+          <a:p>
+            <a:pPr indent="-317500" lvl="1" marL="914400" rtl="0" algn="l">
+              <a:lnSpc>
+                <a:spcPct val="100000"/>
+              </a:lnSpc>
+              <a:spcBef>
+                <a:spcPts val="0"/>
+              </a:spcBef>
+              <a:spcAft>
+                <a:spcPts val="0"/>
+              </a:spcAft>
+              <a:buSzPts val="1400"/>
+              <a:buFont typeface="Lato"/>
+              <a:buChar char="○"/>
+            </a:pPr>
+            <a:r>
+              <a:rPr lang="en-GB">
+                <a:latin typeface="Lato"/>
+                <a:ea typeface="Lato"/>
+                <a:cs typeface="Lato"/>
+                <a:sym typeface="Lato"/>
+              </a:rPr>
+              <a:t>It’s simpler and works better with less data, compared to the </a:t>
+            </a:r>
+            <a:r>
+              <a:rPr lang="en-GB">
+                <a:latin typeface="Lato"/>
+                <a:ea typeface="Lato"/>
+                <a:cs typeface="Lato"/>
+                <a:sym typeface="Lato"/>
+              </a:rPr>
+              <a:t>amount</a:t>
+            </a:r>
+            <a:r>
+              <a:rPr lang="en-GB">
+                <a:latin typeface="Lato"/>
+                <a:ea typeface="Lato"/>
+                <a:cs typeface="Lato"/>
+                <a:sym typeface="Lato"/>
+              </a:rPr>
+              <a:t> of data needed for NN  </a:t>
+            </a:r>
+            <a:endParaRPr>
+              <a:latin typeface="Lato"/>
+              <a:ea typeface="Lato"/>
+              <a:cs typeface="Lato"/>
+              <a:sym typeface="Lato"/>
+            </a:endParaRPr>
+          </a:p>
+          <a:p>
+            <a:pPr indent="-317500" lvl="1" marL="914400" rtl="0" algn="l">
+              <a:lnSpc>
+                <a:spcPct val="100000"/>
+              </a:lnSpc>
+              <a:spcBef>
+                <a:spcPts val="0"/>
+              </a:spcBef>
+              <a:spcAft>
+                <a:spcPts val="0"/>
+              </a:spcAft>
+              <a:buSzPts val="1400"/>
+              <a:buFont typeface="Lato"/>
+              <a:buChar char="○"/>
+            </a:pPr>
+            <a:r>
+              <a:rPr lang="en-GB">
+                <a:latin typeface="Lato"/>
+                <a:ea typeface="Lato"/>
+                <a:cs typeface="Lato"/>
+                <a:sym typeface="Lato"/>
+              </a:rPr>
+              <a:t>It does not work well on data sets with a lot of noise</a:t>
+            </a:r>
+            <a:endParaRPr>
+              <a:latin typeface="Lato"/>
+              <a:ea typeface="Lato"/>
+              <a:cs typeface="Lato"/>
+              <a:sym typeface="Lato"/>
+            </a:endParaRPr>
           </a:p>
         </p:txBody>
       </p:sp>
@@ -9308,184 +9853,6 @@
         </p:nvSpPr>
         <p:spPr>
           <a:xfrm>
-            <a:off x="2427300" y="1085075"/>
-            <a:ext cx="4727400" cy="400200"/>
-          </a:xfrm>
-          <a:prstGeom prst="rect">
-            <a:avLst/>
-          </a:prstGeom>
-          <a:noFill/>
-          <a:ln>
-            <a:noFill/>
-          </a:ln>
-        </p:spPr>
-        <p:txBody>
-          <a:bodyPr anchorCtr="0" anchor="t" bIns="91425" lIns="91425" spcFirstLastPara="1" rIns="91425" wrap="square" tIns="91425">
-            <a:spAutoFit/>
-          </a:bodyPr>
-          <a:lstStyle/>
-          <a:p>
-            <a:pPr indent="0" lvl="0" marL="0" rtl="0" algn="l">
-              <a:spcBef>
-                <a:spcPts val="0"/>
-              </a:spcBef>
-              <a:spcAft>
-                <a:spcPts val="0"/>
-              </a:spcAft>
-              <a:buNone/>
-            </a:pPr>
-            <a:r>
-              <a:rPr lang="en-GB">
-                <a:latin typeface="Lato"/>
-                <a:ea typeface="Lato"/>
-                <a:cs typeface="Lato"/>
-                <a:sym typeface="Lato"/>
-              </a:rPr>
-              <a:t>Connectionist Master Algorithm : Neural Network </a:t>
-            </a:r>
-            <a:endParaRPr>
-              <a:latin typeface="Lato"/>
-              <a:ea typeface="Lato"/>
-              <a:cs typeface="Lato"/>
-              <a:sym typeface="Lato"/>
-            </a:endParaRPr>
-          </a:p>
-        </p:txBody>
-      </p:sp>
-      <p:sp>
-        <p:nvSpPr>
-          <p:cNvPr id="177" name="Google Shape;177;p26"/>
-          <p:cNvSpPr txBox="1"/>
-          <p:nvPr/>
-        </p:nvSpPr>
-        <p:spPr>
-          <a:xfrm>
-            <a:off x="665925" y="590900"/>
-            <a:ext cx="5776200" cy="431100"/>
-          </a:xfrm>
-          <a:prstGeom prst="rect">
-            <a:avLst/>
-          </a:prstGeom>
-          <a:noFill/>
-          <a:ln>
-            <a:noFill/>
-          </a:ln>
-        </p:spPr>
-        <p:txBody>
-          <a:bodyPr anchorCtr="0" anchor="t" bIns="91425" lIns="91425" spcFirstLastPara="1" rIns="91425" wrap="square" tIns="91425">
-            <a:spAutoFit/>
-          </a:bodyPr>
-          <a:lstStyle/>
-          <a:p>
-            <a:pPr indent="0" lvl="0" marL="0" rtl="0" algn="l">
-              <a:spcBef>
-                <a:spcPts val="0"/>
-              </a:spcBef>
-              <a:spcAft>
-                <a:spcPts val="0"/>
-              </a:spcAft>
-              <a:buNone/>
-            </a:pPr>
-            <a:r>
-              <a:rPr b="1" lang="en-GB" sz="1600">
-                <a:latin typeface="Lato"/>
-                <a:ea typeface="Lato"/>
-                <a:cs typeface="Lato"/>
-                <a:sym typeface="Lato"/>
-              </a:rPr>
-              <a:t>Models examples</a:t>
-            </a:r>
-            <a:r>
-              <a:rPr b="1" lang="en-GB" sz="1600">
-                <a:latin typeface="Lato"/>
-                <a:ea typeface="Lato"/>
-                <a:cs typeface="Lato"/>
-                <a:sym typeface="Lato"/>
-              </a:rPr>
-              <a:t> ? </a:t>
-            </a:r>
-            <a:endParaRPr b="1" sz="1500"/>
-          </a:p>
-        </p:txBody>
-      </p:sp>
-      <p:sp>
-        <p:nvSpPr>
-          <p:cNvPr id="178" name="Google Shape;178;p26"/>
-          <p:cNvSpPr txBox="1"/>
-          <p:nvPr/>
-        </p:nvSpPr>
-        <p:spPr>
-          <a:xfrm>
-            <a:off x="3012850" y="1631275"/>
-            <a:ext cx="3000000" cy="323100"/>
-          </a:xfrm>
-          <a:prstGeom prst="rect">
-            <a:avLst/>
-          </a:prstGeom>
-          <a:noFill/>
-          <a:ln>
-            <a:noFill/>
-          </a:ln>
-        </p:spPr>
-        <p:txBody>
-          <a:bodyPr anchorCtr="0" anchor="t" bIns="91425" lIns="91425" spcFirstLastPara="1" rIns="91425" wrap="square" tIns="91425">
-            <a:spAutoFit/>
-          </a:bodyPr>
-          <a:lstStyle/>
-          <a:p>
-            <a:pPr indent="0" lvl="0" marL="0" rtl="0" algn="l">
-              <a:lnSpc>
-                <a:spcPct val="115000"/>
-              </a:lnSpc>
-              <a:spcBef>
-                <a:spcPts val="0"/>
-              </a:spcBef>
-              <a:spcAft>
-                <a:spcPts val="0"/>
-              </a:spcAft>
-              <a:buNone/>
-            </a:pPr>
-            <a:r>
-              <a:rPr b="1" lang="en-GB" sz="900"/>
-              <a:t>Vanilla neural network </a:t>
-            </a:r>
-            <a:endParaRPr sz="900"/>
-          </a:p>
-        </p:txBody>
-      </p:sp>
-    </p:spTree>
-  </p:cSld>
-  <p:clrMapOvr>
-    <a:masterClrMapping/>
-  </p:clrMapOvr>
-</p:sld>
-</file>
-
-<file path=ppt/slides/slide15.xml><?xml version="1.0" encoding="utf-8"?>
-<p:sld xmlns:a="http://schemas.openxmlformats.org/drawingml/2006/main" xmlns:r="http://schemas.openxmlformats.org/officeDocument/2006/relationships" xmlns:mc="http://schemas.openxmlformats.org/markup-compatibility/2006" xmlns:mv="urn:schemas-microsoft-com:mac:vml" xmlns:p="http://schemas.openxmlformats.org/presentationml/2006/main" xmlns:c="http://schemas.openxmlformats.org/drawingml/2006/chart" xmlns:dgm="http://schemas.openxmlformats.org/drawingml/2006/diagram" xmlns:o="urn:schemas-microsoft-com:office:office" xmlns:v="urn:schemas-microsoft-com:vml" xmlns:pvml="urn:schemas-microsoft-com:office:powerpoint" xmlns:com="http://schemas.openxmlformats.org/drawingml/2006/compatibility" xmlns:p14="http://schemas.microsoft.com/office/powerpoint/2010/main" xmlns:p15="http://schemas.microsoft.com/office/powerpoint/2012/main" xmlns:ahyp="http://schemas.microsoft.com/office/drawing/2018/hyperlinkcolor">
-  <p:cSld>
-    <p:spTree>
-      <p:nvGrpSpPr>
-        <p:cNvPr id="182" name="Shape 182"/>
-        <p:cNvGrpSpPr/>
-        <p:nvPr/>
-      </p:nvGrpSpPr>
-      <p:grpSpPr>
-        <a:xfrm>
-          <a:off x="0" y="0"/>
-          <a:ext cx="0" cy="0"/>
-          <a:chOff x="0" y="0"/>
-          <a:chExt cx="0" cy="0"/>
-        </a:xfrm>
-      </p:grpSpPr>
-      <p:sp>
-        <p:nvSpPr>
-          <p:cNvPr id="183" name="Google Shape;183;p27"/>
-          <p:cNvSpPr txBox="1"/>
-          <p:nvPr/>
-        </p:nvSpPr>
-        <p:spPr>
-          <a:xfrm>
             <a:off x="2266575" y="1113500"/>
             <a:ext cx="6439200" cy="400200"/>
           </a:xfrm>
@@ -9513,7 +9880,7 @@
               <a:buNone/>
             </a:pPr>
             <a:r>
-              <a:rPr lang="en-GB">
+              <a:rPr b="1" lang="en-GB">
                 <a:latin typeface="Lato"/>
                 <a:ea typeface="Lato"/>
                 <a:cs typeface="Lato"/>
@@ -9522,7 +9889,7 @@
               <a:t>Evolutionaries</a:t>
             </a:r>
             <a:r>
-              <a:rPr lang="en-GB">
+              <a:rPr b="1" lang="en-GB">
                 <a:latin typeface="Lato"/>
                 <a:ea typeface="Lato"/>
                 <a:cs typeface="Lato"/>
@@ -9530,7 +9897,7 @@
               </a:rPr>
               <a:t> Master Algorithm : (pick a genetic algorithm)</a:t>
             </a:r>
-            <a:endParaRPr>
+            <a:endParaRPr b="1">
               <a:latin typeface="Lato"/>
               <a:ea typeface="Lato"/>
               <a:cs typeface="Lato"/>
@@ -9541,7 +9908,7 @@
       </p:sp>
       <p:sp>
         <p:nvSpPr>
-          <p:cNvPr id="184" name="Google Shape;184;p27"/>
+          <p:cNvPr id="177" name="Google Shape;177;p26"/>
           <p:cNvSpPr txBox="1"/>
           <p:nvPr/>
         </p:nvSpPr>
@@ -9594,12 +9961,12 @@
 </p:sld>
 </file>
 
-<file path=ppt/slides/slide16.xml><?xml version="1.0" encoding="utf-8"?>
+<file path=ppt/slides/slide15.xml><?xml version="1.0" encoding="utf-8"?>
 <p:sld xmlns:a="http://schemas.openxmlformats.org/drawingml/2006/main" xmlns:r="http://schemas.openxmlformats.org/officeDocument/2006/relationships" xmlns:mc="http://schemas.openxmlformats.org/markup-compatibility/2006" xmlns:mv="urn:schemas-microsoft-com:mac:vml" xmlns:p="http://schemas.openxmlformats.org/presentationml/2006/main" xmlns:c="http://schemas.openxmlformats.org/drawingml/2006/chart" xmlns:dgm="http://schemas.openxmlformats.org/drawingml/2006/diagram" xmlns:o="urn:schemas-microsoft-com:office:office" xmlns:v="urn:schemas-microsoft-com:vml" xmlns:pvml="urn:schemas-microsoft-com:office:powerpoint" xmlns:com="http://schemas.openxmlformats.org/drawingml/2006/compatibility" xmlns:p14="http://schemas.microsoft.com/office/powerpoint/2010/main" xmlns:p15="http://schemas.microsoft.com/office/powerpoint/2012/main" xmlns:ahyp="http://schemas.microsoft.com/office/drawing/2018/hyperlinkcolor">
   <p:cSld>
     <p:spTree>
       <p:nvGrpSpPr>
-        <p:cNvPr id="188" name="Shape 188"/>
+        <p:cNvPr id="181" name="Shape 181"/>
         <p:cNvGrpSpPr/>
         <p:nvPr/>
       </p:nvGrpSpPr>
@@ -9613,7 +9980,149 @@
       </p:grpSpPr>
       <p:sp>
         <p:nvSpPr>
-          <p:cNvPr id="189" name="Google Shape;189;p28"/>
+          <p:cNvPr id="182" name="Google Shape;182;p27"/>
+          <p:cNvSpPr txBox="1"/>
+          <p:nvPr/>
+        </p:nvSpPr>
+        <p:spPr>
+          <a:xfrm>
+            <a:off x="2668175" y="1221000"/>
+            <a:ext cx="3487200" cy="400200"/>
+          </a:xfrm>
+          <a:prstGeom prst="rect">
+            <a:avLst/>
+          </a:prstGeom>
+          <a:noFill/>
+          <a:ln>
+            <a:noFill/>
+          </a:ln>
+        </p:spPr>
+        <p:txBody>
+          <a:bodyPr anchorCtr="0" anchor="t" bIns="91425" lIns="91425" spcFirstLastPara="1" rIns="91425" wrap="square" tIns="91425">
+            <a:spAutoFit/>
+          </a:bodyPr>
+          <a:lstStyle/>
+          <a:p>
+            <a:pPr indent="0" lvl="0" marL="0" rtl="0" algn="ctr">
+              <a:spcBef>
+                <a:spcPts val="0"/>
+              </a:spcBef>
+              <a:spcAft>
+                <a:spcPts val="0"/>
+              </a:spcAft>
+              <a:buNone/>
+            </a:pPr>
+            <a:r>
+              <a:rPr b="1" lang="en-GB">
+                <a:latin typeface="Lato"/>
+                <a:ea typeface="Lato"/>
+                <a:cs typeface="Lato"/>
+                <a:sym typeface="Lato"/>
+              </a:rPr>
+              <a:t>Bias </a:t>
+            </a:r>
+            <a:r>
+              <a:rPr b="1" lang="en-GB">
+                <a:latin typeface="Lato"/>
+                <a:ea typeface="Lato"/>
+                <a:cs typeface="Lato"/>
+                <a:sym typeface="Lato"/>
+              </a:rPr>
+              <a:t>vs </a:t>
+            </a:r>
+            <a:r>
+              <a:rPr b="1" lang="en-GB">
+                <a:latin typeface="Lato"/>
+                <a:ea typeface="Lato"/>
+                <a:cs typeface="Lato"/>
+                <a:sym typeface="Lato"/>
+              </a:rPr>
+              <a:t>variance tradeoff</a:t>
+            </a:r>
+            <a:endParaRPr b="1">
+              <a:latin typeface="Lato"/>
+              <a:ea typeface="Lato"/>
+              <a:cs typeface="Lato"/>
+              <a:sym typeface="Lato"/>
+            </a:endParaRPr>
+          </a:p>
+        </p:txBody>
+      </p:sp>
+      <p:sp>
+        <p:nvSpPr>
+          <p:cNvPr id="183" name="Google Shape;183;p27"/>
+          <p:cNvSpPr txBox="1"/>
+          <p:nvPr/>
+        </p:nvSpPr>
+        <p:spPr>
+          <a:xfrm>
+            <a:off x="682475" y="615875"/>
+            <a:ext cx="4153200" cy="431100"/>
+          </a:xfrm>
+          <a:prstGeom prst="rect">
+            <a:avLst/>
+          </a:prstGeom>
+          <a:noFill/>
+          <a:ln>
+            <a:noFill/>
+          </a:ln>
+        </p:spPr>
+        <p:txBody>
+          <a:bodyPr anchorCtr="0" anchor="t" bIns="91425" lIns="91425" spcFirstLastPara="1" rIns="91425" wrap="square" tIns="91425">
+            <a:spAutoFit/>
+          </a:bodyPr>
+          <a:lstStyle/>
+          <a:p>
+            <a:pPr indent="0" lvl="0" marL="0" rtl="0" algn="l">
+              <a:spcBef>
+                <a:spcPts val="0"/>
+              </a:spcBef>
+              <a:spcAft>
+                <a:spcPts val="0"/>
+              </a:spcAft>
+              <a:buNone/>
+            </a:pPr>
+            <a:r>
+              <a:rPr b="1" lang="en-GB" sz="1600">
+                <a:latin typeface="Lato"/>
+                <a:ea typeface="Lato"/>
+                <a:cs typeface="Lato"/>
+                <a:sym typeface="Lato"/>
+              </a:rPr>
+              <a:t>What is machine learning  ? </a:t>
+            </a:r>
+            <a:endParaRPr b="1" sz="1500"/>
+          </a:p>
+        </p:txBody>
+      </p:sp>
+    </p:spTree>
+  </p:cSld>
+  <p:clrMapOvr>
+    <a:masterClrMapping/>
+  </p:clrMapOvr>
+</p:sld>
+</file>
+
+<file path=ppt/slides/slide16.xml><?xml version="1.0" encoding="utf-8"?>
+<p:sld xmlns:a="http://schemas.openxmlformats.org/drawingml/2006/main" xmlns:r="http://schemas.openxmlformats.org/officeDocument/2006/relationships" xmlns:mc="http://schemas.openxmlformats.org/markup-compatibility/2006" xmlns:mv="urn:schemas-microsoft-com:mac:vml" xmlns:p="http://schemas.openxmlformats.org/presentationml/2006/main" xmlns:c="http://schemas.openxmlformats.org/drawingml/2006/chart" xmlns:dgm="http://schemas.openxmlformats.org/drawingml/2006/diagram" xmlns:o="urn:schemas-microsoft-com:office:office" xmlns:v="urn:schemas-microsoft-com:vml" xmlns:pvml="urn:schemas-microsoft-com:office:powerpoint" xmlns:com="http://schemas.openxmlformats.org/drawingml/2006/compatibility" xmlns:p14="http://schemas.microsoft.com/office/powerpoint/2010/main" xmlns:p15="http://schemas.microsoft.com/office/powerpoint/2012/main" xmlns:ahyp="http://schemas.microsoft.com/office/drawing/2018/hyperlinkcolor">
+  <p:cSld>
+    <p:spTree>
+      <p:nvGrpSpPr>
+        <p:cNvPr id="187" name="Shape 187"/>
+        <p:cNvGrpSpPr/>
+        <p:nvPr/>
+      </p:nvGrpSpPr>
+      <p:grpSpPr>
+        <a:xfrm>
+          <a:off x="0" y="0"/>
+          <a:ext cx="0" cy="0"/>
+          <a:chOff x="0" y="0"/>
+          <a:chExt cx="0" cy="0"/>
+        </a:xfrm>
+      </p:grpSpPr>
+      <p:sp>
+        <p:nvSpPr>
+          <p:cNvPr id="188" name="Google Shape;188;p28"/>
           <p:cNvSpPr txBox="1"/>
           <p:nvPr/>
         </p:nvSpPr>
@@ -9662,6 +10171,78 @@
                 <a:sym typeface="Lato"/>
               </a:rPr>
               <a:t>? </a:t>
+            </a:r>
+            <a:endParaRPr b="1" sz="1500"/>
+          </a:p>
+        </p:txBody>
+      </p:sp>
+    </p:spTree>
+  </p:cSld>
+  <p:clrMapOvr>
+    <a:masterClrMapping/>
+  </p:clrMapOvr>
+</p:sld>
+</file>
+
+<file path=ppt/slides/slide17.xml><?xml version="1.0" encoding="utf-8"?>
+<p:sld xmlns:a="http://schemas.openxmlformats.org/drawingml/2006/main" xmlns:r="http://schemas.openxmlformats.org/officeDocument/2006/relationships" xmlns:mc="http://schemas.openxmlformats.org/markup-compatibility/2006" xmlns:mv="urn:schemas-microsoft-com:mac:vml" xmlns:p="http://schemas.openxmlformats.org/presentationml/2006/main" xmlns:c="http://schemas.openxmlformats.org/drawingml/2006/chart" xmlns:dgm="http://schemas.openxmlformats.org/drawingml/2006/diagram" xmlns:o="urn:schemas-microsoft-com:office:office" xmlns:v="urn:schemas-microsoft-com:vml" xmlns:pvml="urn:schemas-microsoft-com:office:powerpoint" xmlns:com="http://schemas.openxmlformats.org/drawingml/2006/compatibility" xmlns:p14="http://schemas.microsoft.com/office/powerpoint/2010/main" xmlns:p15="http://schemas.microsoft.com/office/powerpoint/2012/main" xmlns:ahyp="http://schemas.microsoft.com/office/drawing/2018/hyperlinkcolor">
+  <p:cSld>
+    <p:spTree>
+      <p:nvGrpSpPr>
+        <p:cNvPr id="192" name="Shape 192"/>
+        <p:cNvGrpSpPr/>
+        <p:nvPr/>
+      </p:nvGrpSpPr>
+      <p:grpSpPr>
+        <a:xfrm>
+          <a:off x="0" y="0"/>
+          <a:ext cx="0" cy="0"/>
+          <a:chOff x="0" y="0"/>
+          <a:chExt cx="0" cy="0"/>
+        </a:xfrm>
+      </p:grpSpPr>
+      <p:sp>
+        <p:nvSpPr>
+          <p:cNvPr id="193" name="Google Shape;193;p29"/>
+          <p:cNvSpPr txBox="1"/>
+          <p:nvPr/>
+        </p:nvSpPr>
+        <p:spPr>
+          <a:xfrm>
+            <a:off x="699200" y="615875"/>
+            <a:ext cx="7539600" cy="431100"/>
+          </a:xfrm>
+          <a:prstGeom prst="rect">
+            <a:avLst/>
+          </a:prstGeom>
+          <a:noFill/>
+          <a:ln>
+            <a:noFill/>
+          </a:ln>
+        </p:spPr>
+        <p:txBody>
+          <a:bodyPr anchorCtr="0" anchor="t" bIns="91425" lIns="91425" spcFirstLastPara="1" rIns="91425" wrap="square" tIns="91425">
+            <a:spAutoFit/>
+          </a:bodyPr>
+          <a:lstStyle/>
+          <a:p>
+            <a:pPr indent="0" lvl="0" marL="0" rtl="0" algn="ctr">
+              <a:spcBef>
+                <a:spcPts val="0"/>
+              </a:spcBef>
+              <a:spcAft>
+                <a:spcPts val="0"/>
+              </a:spcAft>
+              <a:buNone/>
+            </a:pPr>
+            <a:r>
+              <a:rPr b="1" lang="en-GB" sz="1600">
+                <a:latin typeface="Lato"/>
+                <a:ea typeface="Lato"/>
+                <a:cs typeface="Lato"/>
+                <a:sym typeface="Lato"/>
+              </a:rPr>
+              <a:t>Recap </a:t>
             </a:r>
             <a:endParaRPr b="1" sz="1500"/>
           </a:p>
@@ -9742,7 +10323,7 @@
                 <a:cs typeface="Lato"/>
                 <a:sym typeface="Lato"/>
               </a:rPr>
-              <a:t>presentation</a:t>
+              <a:t>workshop</a:t>
             </a:r>
             <a:r>
               <a:rPr lang="en-GB">
@@ -10708,7 +11289,7 @@
         <p:spPr>
           <a:xfrm>
             <a:off x="649875" y="1203800"/>
-            <a:ext cx="5442600" cy="4063500"/>
+            <a:ext cx="5442600" cy="3848100"/>
           </a:xfrm>
           <a:prstGeom prst="rect">
             <a:avLst/>
@@ -10853,7 +11434,7 @@
                 <a:cs typeface="Lato"/>
                 <a:sym typeface="Lato"/>
               </a:rPr>
-              <a:t>Transcription </a:t>
+              <a:t>Machine translation </a:t>
             </a:r>
             <a:endParaRPr>
               <a:latin typeface="Lato"/>
@@ -10881,7 +11462,7 @@
                 <a:cs typeface="Lato"/>
                 <a:sym typeface="Lato"/>
               </a:rPr>
-              <a:t>Machine translation </a:t>
+              <a:t>Structured input </a:t>
             </a:r>
             <a:endParaRPr>
               <a:latin typeface="Lato"/>
@@ -10909,7 +11490,7 @@
                 <a:cs typeface="Lato"/>
                 <a:sym typeface="Lato"/>
               </a:rPr>
-              <a:t>Structured input </a:t>
+              <a:t>Anomaly detection </a:t>
             </a:r>
             <a:endParaRPr>
               <a:latin typeface="Lato"/>
@@ -10937,7 +11518,7 @@
                 <a:cs typeface="Lato"/>
                 <a:sym typeface="Lato"/>
               </a:rPr>
-              <a:t>Anomaly detection </a:t>
+              <a:t>Synthesis and sampling </a:t>
             </a:r>
             <a:endParaRPr>
               <a:latin typeface="Lato"/>
@@ -10965,7 +11546,7 @@
                 <a:cs typeface="Lato"/>
                 <a:sym typeface="Lato"/>
               </a:rPr>
-              <a:t>Synthesis and sampling </a:t>
+              <a:t>Imputation of missing value</a:t>
             </a:r>
             <a:endParaRPr>
               <a:latin typeface="Lato"/>
@@ -10993,7 +11574,7 @@
                 <a:cs typeface="Lato"/>
                 <a:sym typeface="Lato"/>
               </a:rPr>
-              <a:t>Imputation of missing value</a:t>
+              <a:t>Denoising </a:t>
             </a:r>
             <a:endParaRPr>
               <a:latin typeface="Lato"/>
@@ -11003,53 +11584,17 @@
             </a:endParaRPr>
           </a:p>
           <a:p>
-            <a:pPr indent="-317500" lvl="1" marL="914400" rtl="0" algn="l">
-              <a:spcBef>
-                <a:spcPts val="0"/>
-              </a:spcBef>
-              <a:spcAft>
-                <a:spcPts val="0"/>
-              </a:spcAft>
-              <a:buSzPts val="1400"/>
-              <a:buFont typeface="Lato"/>
-              <a:buChar char="○"/>
+            <a:pPr indent="0" lvl="0" marL="0" rtl="0" algn="l">
+              <a:spcBef>
+                <a:spcPts val="0"/>
+              </a:spcBef>
+              <a:spcAft>
+                <a:spcPts val="0"/>
+              </a:spcAft>
+              <a:buNone/>
             </a:pPr>
             <a:r>
-              <a:rPr lang="en-GB">
-                <a:latin typeface="Lato"/>
-                <a:ea typeface="Lato"/>
-                <a:cs typeface="Lato"/>
-                <a:sym typeface="Lato"/>
-              </a:rPr>
-              <a:t>Denoising </a:t>
-            </a:r>
-            <a:endParaRPr>
-              <a:latin typeface="Lato"/>
-              <a:ea typeface="Lato"/>
-              <a:cs typeface="Lato"/>
-              <a:sym typeface="Lato"/>
-            </a:endParaRPr>
-          </a:p>
-          <a:p>
-            <a:pPr indent="-317500" lvl="1" marL="914400" rtl="0" algn="l">
-              <a:spcBef>
-                <a:spcPts val="0"/>
-              </a:spcBef>
-              <a:spcAft>
-                <a:spcPts val="0"/>
-              </a:spcAft>
-              <a:buSzPts val="1400"/>
-              <a:buFont typeface="Lato"/>
-              <a:buChar char="○"/>
-            </a:pPr>
-            <a:r>
-              <a:rPr lang="en-GB">
-                <a:latin typeface="Lato"/>
-                <a:ea typeface="Lato"/>
-                <a:cs typeface="Lato"/>
-                <a:sym typeface="Lato"/>
-              </a:rPr>
-              <a:t>PDF estimation (probability density functions)</a:t>
+              <a:t/>
             </a:r>
             <a:endParaRPr>
               <a:latin typeface="Lato"/>
@@ -11543,8 +12088,8 @@
         </p:nvSpPr>
         <p:spPr>
           <a:xfrm>
-            <a:off x="680250" y="1887400"/>
-            <a:ext cx="7783500" cy="1477500"/>
+            <a:off x="897525" y="1976325"/>
+            <a:ext cx="7566300" cy="1477500"/>
           </a:xfrm>
           <a:prstGeom prst="rect">
             <a:avLst/>
@@ -11954,7 +12499,7 @@
             <a:tbl>
               <a:tblPr>
                 <a:noFill/>
-                <a:tableStyleId>{53791A02-E7DA-49B2-A242-FF2989A80FCB}</a:tableStyleId>
+                <a:tableStyleId>{2FC4B9FE-E94F-41F1-9049-A494CBA73F5C}</a:tableStyleId>
               </a:tblPr>
               <a:tblGrid>
                 <a:gridCol w="1121400"/>

</xml_diff>